<commit_message>
update presentation and reading list
</commit_message>
<xml_diff>
--- a/extending_stats_toolbox_phd-day2019_short.pptx
+++ b/extending_stats_toolbox_phd-day2019_short.pptx
@@ -3689,8 +3689,8 @@
           </a:p>
         </p:txBody>
       </p:sp>
-      <mc:AlternateContent xmlns:mc="http://schemas.openxmlformats.org/markup-compatibility/2006">
-        <mc:Choice xmlns:a14="http://schemas.microsoft.com/office/drawing/2010/main" Requires="a14">
+      <mc:AlternateContent xmlns:mc="http://schemas.openxmlformats.org/markup-compatibility/2006" xmlns:a14="http://schemas.microsoft.com/office/drawing/2010/main">
+        <mc:Choice Requires="a14">
           <p:sp>
             <p:nvSpPr>
               <p:cNvPr id="4" name="Rectangle 3">
@@ -4374,7 +4374,7 @@
             </p:txBody>
           </p:sp>
         </mc:Choice>
-        <mc:Fallback>
+        <mc:Fallback xmlns="">
           <p:sp>
             <p:nvSpPr>
               <p:cNvPr id="4" name="Rectangle 3">
@@ -4419,8 +4419,8 @@
           </p:sp>
         </mc:Fallback>
       </mc:AlternateContent>
-      <mc:AlternateContent xmlns:mc="http://schemas.openxmlformats.org/markup-compatibility/2006">
-        <mc:Choice xmlns:a14="http://schemas.microsoft.com/office/drawing/2010/main" Requires="a14">
+      <mc:AlternateContent xmlns:mc="http://schemas.openxmlformats.org/markup-compatibility/2006" xmlns:a14="http://schemas.microsoft.com/office/drawing/2010/main">
+        <mc:Choice Requires="a14">
           <p:sp>
             <p:nvSpPr>
               <p:cNvPr id="2" name="Rectangle 1">
@@ -4967,7 +4967,7 @@
             </p:txBody>
           </p:sp>
         </mc:Choice>
-        <mc:Fallback>
+        <mc:Fallback xmlns="">
           <p:sp>
             <p:nvSpPr>
               <p:cNvPr id="2" name="Rectangle 1">
@@ -5012,8 +5012,8 @@
           </p:sp>
         </mc:Fallback>
       </mc:AlternateContent>
-      <mc:AlternateContent xmlns:mc="http://schemas.openxmlformats.org/markup-compatibility/2006">
-        <mc:Choice xmlns:a14="http://schemas.microsoft.com/office/drawing/2010/main" Requires="a14">
+      <mc:AlternateContent xmlns:mc="http://schemas.openxmlformats.org/markup-compatibility/2006" xmlns:a14="http://schemas.microsoft.com/office/drawing/2010/main">
+        <mc:Choice Requires="a14">
           <p:sp>
             <p:nvSpPr>
               <p:cNvPr id="6" name="Rectangle 5">
@@ -5718,7 +5718,7 @@
             </p:txBody>
           </p:sp>
         </mc:Choice>
-        <mc:Fallback>
+        <mc:Fallback xmlns="">
           <p:sp>
             <p:nvSpPr>
               <p:cNvPr id="6" name="Rectangle 5">
@@ -11392,6 +11392,48 @@
           </a:p>
         </p:txBody>
       </p:sp>
+      <p:sp>
+        <p:nvSpPr>
+          <p:cNvPr id="5" name="Rectangle 4">
+            <a:extLst>
+              <a:ext uri="{FF2B5EF4-FFF2-40B4-BE49-F238E27FC236}">
+                <a16:creationId xmlns:a16="http://schemas.microsoft.com/office/drawing/2014/main" id="{EE74DE73-E339-44CF-8F9B-98A7706560F4}"/>
+              </a:ext>
+            </a:extLst>
+          </p:cNvPr>
+          <p:cNvSpPr/>
+          <p:nvPr/>
+        </p:nvSpPr>
+        <p:spPr>
+          <a:xfrm>
+            <a:off x="6387129" y="6845203"/>
+            <a:ext cx="11174681" cy="923330"/>
+          </a:xfrm>
+          <a:prstGeom prst="rect">
+            <a:avLst/>
+          </a:prstGeom>
+        </p:spPr>
+        <p:txBody>
+          <a:bodyPr wrap="square">
+            <a:spAutoFit/>
+          </a:bodyPr>
+          <a:lstStyle/>
+          <a:p>
+            <a:r>
+              <a:rPr lang="en-US" sz="5400" b="1" dirty="0"/>
+              <a:t>Material + reading list on </a:t>
+            </a:r>
+            <a:r>
+              <a:rPr lang="en-US" sz="5400" b="1" dirty="0" err="1"/>
+              <a:t>Github</a:t>
+            </a:r>
+            <a:r>
+              <a:rPr lang="en-US" sz="5400" b="1" dirty="0"/>
+              <a:t>!</a:t>
+            </a:r>
+          </a:p>
+        </p:txBody>
+      </p:sp>
     </p:spTree>
     <p:extLst>
       <p:ext uri="{BB962C8B-B14F-4D97-AF65-F5344CB8AC3E}">
@@ -11402,6 +11444,84 @@
   <p:clrMapOvr>
     <a:masterClrMapping/>
   </p:clrMapOvr>
+  <p:timing>
+    <p:tnLst>
+      <p:par>
+        <p:cTn id="1" dur="indefinite" restart="never" nodeType="tmRoot">
+          <p:childTnLst>
+            <p:seq concurrent="1" nextAc="seek">
+              <p:cTn id="2" dur="indefinite" nodeType="mainSeq">
+                <p:childTnLst>
+                  <p:par>
+                    <p:cTn id="3" fill="hold">
+                      <p:stCondLst>
+                        <p:cond delay="indefinite"/>
+                      </p:stCondLst>
+                      <p:childTnLst>
+                        <p:par>
+                          <p:cTn id="4" fill="hold">
+                            <p:stCondLst>
+                              <p:cond delay="0"/>
+                            </p:stCondLst>
+                            <p:childTnLst>
+                              <p:par>
+                                <p:cTn id="5" presetID="1" presetClass="entr" presetSubtype="0" fill="hold" grpId="0" nodeType="clickEffect">
+                                  <p:stCondLst>
+                                    <p:cond delay="0"/>
+                                  </p:stCondLst>
+                                  <p:childTnLst>
+                                    <p:set>
+                                      <p:cBhvr>
+                                        <p:cTn id="6" dur="1" fill="hold">
+                                          <p:stCondLst>
+                                            <p:cond delay="0"/>
+                                          </p:stCondLst>
+                                        </p:cTn>
+                                        <p:tgtEl>
+                                          <p:spTgt spid="5"/>
+                                        </p:tgtEl>
+                                        <p:attrNameLst>
+                                          <p:attrName>style.visibility</p:attrName>
+                                        </p:attrNameLst>
+                                      </p:cBhvr>
+                                      <p:to>
+                                        <p:strVal val="visible"/>
+                                      </p:to>
+                                    </p:set>
+                                  </p:childTnLst>
+                                </p:cTn>
+                              </p:par>
+                            </p:childTnLst>
+                          </p:cTn>
+                        </p:par>
+                      </p:childTnLst>
+                    </p:cTn>
+                  </p:par>
+                </p:childTnLst>
+              </p:cTn>
+              <p:prevCondLst>
+                <p:cond evt="onPrev" delay="0">
+                  <p:tgtEl>
+                    <p:sldTgt/>
+                  </p:tgtEl>
+                </p:cond>
+              </p:prevCondLst>
+              <p:nextCondLst>
+                <p:cond evt="onNext" delay="0">
+                  <p:tgtEl>
+                    <p:sldTgt/>
+                  </p:tgtEl>
+                </p:cond>
+              </p:nextCondLst>
+            </p:seq>
+          </p:childTnLst>
+        </p:cTn>
+      </p:par>
+    </p:tnLst>
+    <p:bldLst>
+      <p:bldP spid="5" grpId="0"/>
+    </p:bldLst>
+  </p:timing>
 </p:sld>
 </file>
 
@@ -25322,8 +25442,8 @@
           </a:p>
         </p:txBody>
       </p:sp>
-      <mc:AlternateContent xmlns:mc="http://schemas.openxmlformats.org/markup-compatibility/2006">
-        <mc:Choice xmlns:a14="http://schemas.microsoft.com/office/drawing/2010/main" Requires="a14">
+      <mc:AlternateContent xmlns:mc="http://schemas.openxmlformats.org/markup-compatibility/2006" xmlns:a14="http://schemas.microsoft.com/office/drawing/2010/main">
+        <mc:Choice Requires="a14">
           <p:sp>
             <p:nvSpPr>
               <p:cNvPr id="9" name="Content Placeholder 2">
@@ -25845,7 +25965,7 @@
             </p:txBody>
           </p:sp>
         </mc:Choice>
-        <mc:Fallback>
+        <mc:Fallback xmlns="">
           <p:sp>
             <p:nvSpPr>
               <p:cNvPr id="9" name="Content Placeholder 2">

</xml_diff>